<commit_message>
Updated links for Tuple assignment
</commit_message>
<xml_diff>
--- a/Lecture 7.pptx
+++ b/Lecture 7.pptx
@@ -4,6 +4,9 @@
   <p:sldMasterIdLst>
     <p:sldMasterId id="2147483648" r:id="rId1"/>
   </p:sldMasterIdLst>
+  <p:notesMasterIdLst>
+    <p:notesMasterId r:id="rId9"/>
+  </p:notesMasterIdLst>
   <p:sldIdLst>
     <p:sldId id="256" r:id="rId2"/>
     <p:sldId id="257" r:id="rId3"/>
@@ -118,6 +121,444 @@
 </p:presentation>
 </file>
 
+<file path=ppt/notesMasters/notesMaster1.xml><?xml version="1.0" encoding="utf-8"?>
+<p:notesMaster xmlns:a="http://schemas.openxmlformats.org/drawingml/2006/main" xmlns:r="http://schemas.openxmlformats.org/officeDocument/2006/relationships" xmlns:p="http://schemas.openxmlformats.org/presentationml/2006/main">
+  <p:cSld>
+    <p:bg>
+      <p:bgRef idx="1001">
+        <a:schemeClr val="bg1"/>
+      </p:bgRef>
+    </p:bg>
+    <p:spTree>
+      <p:nvGrpSpPr>
+        <p:cNvPr id="1" name=""/>
+        <p:cNvGrpSpPr/>
+        <p:nvPr/>
+      </p:nvGrpSpPr>
+      <p:grpSpPr>
+        <a:xfrm>
+          <a:off x="0" y="0"/>
+          <a:ext cx="0" cy="0"/>
+          <a:chOff x="0" y="0"/>
+          <a:chExt cx="0" cy="0"/>
+        </a:xfrm>
+      </p:grpSpPr>
+      <p:sp>
+        <p:nvSpPr>
+          <p:cNvPr id="2" name="Header Placeholder 1"/>
+          <p:cNvSpPr>
+            <a:spLocks noGrp="1"/>
+          </p:cNvSpPr>
+          <p:nvPr>
+            <p:ph type="hdr" sz="quarter"/>
+          </p:nvPr>
+        </p:nvSpPr>
+        <p:spPr>
+          <a:xfrm>
+            <a:off x="0" y="0"/>
+            <a:ext cx="2971800" cy="458788"/>
+          </a:xfrm>
+          <a:prstGeom prst="rect">
+            <a:avLst/>
+          </a:prstGeom>
+        </p:spPr>
+        <p:txBody>
+          <a:bodyPr vert="horz" lIns="91440" tIns="45720" rIns="91440" bIns="45720" rtlCol="0"/>
+          <a:lstStyle>
+            <a:lvl1pPr algn="l">
+              <a:defRPr sz="1200"/>
+            </a:lvl1pPr>
+          </a:lstStyle>
+          <a:p>
+            <a:endParaRPr lang="en-IN"/>
+          </a:p>
+        </p:txBody>
+      </p:sp>
+      <p:sp>
+        <p:nvSpPr>
+          <p:cNvPr id="3" name="Date Placeholder 2"/>
+          <p:cNvSpPr>
+            <a:spLocks noGrp="1"/>
+          </p:cNvSpPr>
+          <p:nvPr>
+            <p:ph type="dt" idx="1"/>
+          </p:nvPr>
+        </p:nvSpPr>
+        <p:spPr>
+          <a:xfrm>
+            <a:off x="3884613" y="0"/>
+            <a:ext cx="2971800" cy="458788"/>
+          </a:xfrm>
+          <a:prstGeom prst="rect">
+            <a:avLst/>
+          </a:prstGeom>
+        </p:spPr>
+        <p:txBody>
+          <a:bodyPr vert="horz" lIns="91440" tIns="45720" rIns="91440" bIns="45720" rtlCol="0"/>
+          <a:lstStyle>
+            <a:lvl1pPr algn="r">
+              <a:defRPr sz="1200"/>
+            </a:lvl1pPr>
+          </a:lstStyle>
+          <a:p>
+            <a:fld id="{1A081597-1FC1-463B-9449-43678E05CA24}" type="datetimeFigureOut">
+              <a:rPr lang="en-IN" smtClean="0"/>
+              <a:t>30-08-2021</a:t>
+            </a:fld>
+            <a:endParaRPr lang="en-IN"/>
+          </a:p>
+        </p:txBody>
+      </p:sp>
+      <p:sp>
+        <p:nvSpPr>
+          <p:cNvPr id="4" name="Slide Image Placeholder 3"/>
+          <p:cNvSpPr>
+            <a:spLocks noGrp="1" noRot="1" noChangeAspect="1"/>
+          </p:cNvSpPr>
+          <p:nvPr>
+            <p:ph type="sldImg" idx="2"/>
+          </p:nvPr>
+        </p:nvSpPr>
+        <p:spPr>
+          <a:xfrm>
+            <a:off x="685800" y="1143000"/>
+            <a:ext cx="5486400" cy="3086100"/>
+          </a:xfrm>
+          <a:prstGeom prst="rect">
+            <a:avLst/>
+          </a:prstGeom>
+          <a:noFill/>
+          <a:ln w="12700">
+            <a:solidFill>
+              <a:prstClr val="black"/>
+            </a:solidFill>
+          </a:ln>
+        </p:spPr>
+        <p:txBody>
+          <a:bodyPr vert="horz" lIns="91440" tIns="45720" rIns="91440" bIns="45720" rtlCol="0" anchor="ctr"/>
+          <a:lstStyle/>
+          <a:p>
+            <a:endParaRPr lang="en-IN"/>
+          </a:p>
+        </p:txBody>
+      </p:sp>
+      <p:sp>
+        <p:nvSpPr>
+          <p:cNvPr id="5" name="Notes Placeholder 4"/>
+          <p:cNvSpPr>
+            <a:spLocks noGrp="1"/>
+          </p:cNvSpPr>
+          <p:nvPr>
+            <p:ph type="body" sz="quarter" idx="3"/>
+          </p:nvPr>
+        </p:nvSpPr>
+        <p:spPr>
+          <a:xfrm>
+            <a:off x="685800" y="4400550"/>
+            <a:ext cx="5486400" cy="3600450"/>
+          </a:xfrm>
+          <a:prstGeom prst="rect">
+            <a:avLst/>
+          </a:prstGeom>
+        </p:spPr>
+        <p:txBody>
+          <a:bodyPr vert="horz" lIns="91440" tIns="45720" rIns="91440" bIns="45720" rtlCol="0"/>
+          <a:lstStyle/>
+          <a:p>
+            <a:pPr lvl="0"/>
+            <a:r>
+              <a:rPr lang="en-US"/>
+              <a:t>Click to edit Master text styles</a:t>
+            </a:r>
+          </a:p>
+          <a:p>
+            <a:pPr lvl="1"/>
+            <a:r>
+              <a:rPr lang="en-US"/>
+              <a:t>Second level</a:t>
+            </a:r>
+          </a:p>
+          <a:p>
+            <a:pPr lvl="2"/>
+            <a:r>
+              <a:rPr lang="en-US"/>
+              <a:t>Third level</a:t>
+            </a:r>
+          </a:p>
+          <a:p>
+            <a:pPr lvl="3"/>
+            <a:r>
+              <a:rPr lang="en-US"/>
+              <a:t>Fourth level</a:t>
+            </a:r>
+          </a:p>
+          <a:p>
+            <a:pPr lvl="4"/>
+            <a:r>
+              <a:rPr lang="en-US"/>
+              <a:t>Fifth level</a:t>
+            </a:r>
+            <a:endParaRPr lang="en-IN"/>
+          </a:p>
+        </p:txBody>
+      </p:sp>
+      <p:sp>
+        <p:nvSpPr>
+          <p:cNvPr id="6" name="Footer Placeholder 5"/>
+          <p:cNvSpPr>
+            <a:spLocks noGrp="1"/>
+          </p:cNvSpPr>
+          <p:nvPr>
+            <p:ph type="ftr" sz="quarter" idx="4"/>
+          </p:nvPr>
+        </p:nvSpPr>
+        <p:spPr>
+          <a:xfrm>
+            <a:off x="0" y="8685213"/>
+            <a:ext cx="2971800" cy="458787"/>
+          </a:xfrm>
+          <a:prstGeom prst="rect">
+            <a:avLst/>
+          </a:prstGeom>
+        </p:spPr>
+        <p:txBody>
+          <a:bodyPr vert="horz" lIns="91440" tIns="45720" rIns="91440" bIns="45720" rtlCol="0" anchor="b"/>
+          <a:lstStyle>
+            <a:lvl1pPr algn="l">
+              <a:defRPr sz="1200"/>
+            </a:lvl1pPr>
+          </a:lstStyle>
+          <a:p>
+            <a:endParaRPr lang="en-IN"/>
+          </a:p>
+        </p:txBody>
+      </p:sp>
+      <p:sp>
+        <p:nvSpPr>
+          <p:cNvPr id="7" name="Slide Number Placeholder 6"/>
+          <p:cNvSpPr>
+            <a:spLocks noGrp="1"/>
+          </p:cNvSpPr>
+          <p:nvPr>
+            <p:ph type="sldNum" sz="quarter" idx="5"/>
+          </p:nvPr>
+        </p:nvSpPr>
+        <p:spPr>
+          <a:xfrm>
+            <a:off x="3884613" y="8685213"/>
+            <a:ext cx="2971800" cy="458787"/>
+          </a:xfrm>
+          <a:prstGeom prst="rect">
+            <a:avLst/>
+          </a:prstGeom>
+        </p:spPr>
+        <p:txBody>
+          <a:bodyPr vert="horz" lIns="91440" tIns="45720" rIns="91440" bIns="45720" rtlCol="0" anchor="b"/>
+          <a:lstStyle>
+            <a:lvl1pPr algn="r">
+              <a:defRPr sz="1200"/>
+            </a:lvl1pPr>
+          </a:lstStyle>
+          <a:p>
+            <a:fld id="{280196F8-B092-4C30-94DE-95C749B130C6}" type="slidenum">
+              <a:rPr lang="en-IN" smtClean="0"/>
+              <a:t>‹#›</a:t>
+            </a:fld>
+            <a:endParaRPr lang="en-IN"/>
+          </a:p>
+        </p:txBody>
+      </p:sp>
+    </p:spTree>
+    <p:extLst>
+      <p:ext uri="{BB962C8B-B14F-4D97-AF65-F5344CB8AC3E}">
+        <p14:creationId xmlns:p14="http://schemas.microsoft.com/office/powerpoint/2010/main" val="147697247"/>
+      </p:ext>
+    </p:extLst>
+  </p:cSld>
+  <p:clrMap bg1="lt1" tx1="dk1" bg2="lt2" tx2="dk2" accent1="accent1" accent2="accent2" accent3="accent3" accent4="accent4" accent5="accent5" accent6="accent6" hlink="hlink" folHlink="folHlink"/>
+  <p:notesStyle>
+    <a:lvl1pPr marL="0" algn="l" defTabSz="914400" rtl="0" eaLnBrk="1" latinLnBrk="0" hangingPunct="1">
+      <a:defRPr sz="1200" kern="1200">
+        <a:solidFill>
+          <a:schemeClr val="tx1"/>
+        </a:solidFill>
+        <a:latin typeface="+mn-lt"/>
+        <a:ea typeface="+mn-ea"/>
+        <a:cs typeface="+mn-cs"/>
+      </a:defRPr>
+    </a:lvl1pPr>
+    <a:lvl2pPr marL="457200" algn="l" defTabSz="914400" rtl="0" eaLnBrk="1" latinLnBrk="0" hangingPunct="1">
+      <a:defRPr sz="1200" kern="1200">
+        <a:solidFill>
+          <a:schemeClr val="tx1"/>
+        </a:solidFill>
+        <a:latin typeface="+mn-lt"/>
+        <a:ea typeface="+mn-ea"/>
+        <a:cs typeface="+mn-cs"/>
+      </a:defRPr>
+    </a:lvl2pPr>
+    <a:lvl3pPr marL="914400" algn="l" defTabSz="914400" rtl="0" eaLnBrk="1" latinLnBrk="0" hangingPunct="1">
+      <a:defRPr sz="1200" kern="1200">
+        <a:solidFill>
+          <a:schemeClr val="tx1"/>
+        </a:solidFill>
+        <a:latin typeface="+mn-lt"/>
+        <a:ea typeface="+mn-ea"/>
+        <a:cs typeface="+mn-cs"/>
+      </a:defRPr>
+    </a:lvl3pPr>
+    <a:lvl4pPr marL="1371600" algn="l" defTabSz="914400" rtl="0" eaLnBrk="1" latinLnBrk="0" hangingPunct="1">
+      <a:defRPr sz="1200" kern="1200">
+        <a:solidFill>
+          <a:schemeClr val="tx1"/>
+        </a:solidFill>
+        <a:latin typeface="+mn-lt"/>
+        <a:ea typeface="+mn-ea"/>
+        <a:cs typeface="+mn-cs"/>
+      </a:defRPr>
+    </a:lvl4pPr>
+    <a:lvl5pPr marL="1828800" algn="l" defTabSz="914400" rtl="0" eaLnBrk="1" latinLnBrk="0" hangingPunct="1">
+      <a:defRPr sz="1200" kern="1200">
+        <a:solidFill>
+          <a:schemeClr val="tx1"/>
+        </a:solidFill>
+        <a:latin typeface="+mn-lt"/>
+        <a:ea typeface="+mn-ea"/>
+        <a:cs typeface="+mn-cs"/>
+      </a:defRPr>
+    </a:lvl5pPr>
+    <a:lvl6pPr marL="2286000" algn="l" defTabSz="914400" rtl="0" eaLnBrk="1" latinLnBrk="0" hangingPunct="1">
+      <a:defRPr sz="1200" kern="1200">
+        <a:solidFill>
+          <a:schemeClr val="tx1"/>
+        </a:solidFill>
+        <a:latin typeface="+mn-lt"/>
+        <a:ea typeface="+mn-ea"/>
+        <a:cs typeface="+mn-cs"/>
+      </a:defRPr>
+    </a:lvl6pPr>
+    <a:lvl7pPr marL="2743200" algn="l" defTabSz="914400" rtl="0" eaLnBrk="1" latinLnBrk="0" hangingPunct="1">
+      <a:defRPr sz="1200" kern="1200">
+        <a:solidFill>
+          <a:schemeClr val="tx1"/>
+        </a:solidFill>
+        <a:latin typeface="+mn-lt"/>
+        <a:ea typeface="+mn-ea"/>
+        <a:cs typeface="+mn-cs"/>
+      </a:defRPr>
+    </a:lvl7pPr>
+    <a:lvl8pPr marL="3200400" algn="l" defTabSz="914400" rtl="0" eaLnBrk="1" latinLnBrk="0" hangingPunct="1">
+      <a:defRPr sz="1200" kern="1200">
+        <a:solidFill>
+          <a:schemeClr val="tx1"/>
+        </a:solidFill>
+        <a:latin typeface="+mn-lt"/>
+        <a:ea typeface="+mn-ea"/>
+        <a:cs typeface="+mn-cs"/>
+      </a:defRPr>
+    </a:lvl8pPr>
+    <a:lvl9pPr marL="3657600" algn="l" defTabSz="914400" rtl="0" eaLnBrk="1" latinLnBrk="0" hangingPunct="1">
+      <a:defRPr sz="1200" kern="1200">
+        <a:solidFill>
+          <a:schemeClr val="tx1"/>
+        </a:solidFill>
+        <a:latin typeface="+mn-lt"/>
+        <a:ea typeface="+mn-ea"/>
+        <a:cs typeface="+mn-cs"/>
+      </a:defRPr>
+    </a:lvl9pPr>
+  </p:notesStyle>
+</p:notesMaster>
+</file>
+
+<file path=ppt/notesSlides/notesSlide1.xml><?xml version="1.0" encoding="utf-8"?>
+<p:notes xmlns:a="http://schemas.openxmlformats.org/drawingml/2006/main" xmlns:r="http://schemas.openxmlformats.org/officeDocument/2006/relationships" xmlns:p="http://schemas.openxmlformats.org/presentationml/2006/main">
+  <p:cSld>
+    <p:spTree>
+      <p:nvGrpSpPr>
+        <p:cNvPr id="1" name=""/>
+        <p:cNvGrpSpPr/>
+        <p:nvPr/>
+      </p:nvGrpSpPr>
+      <p:grpSpPr>
+        <a:xfrm>
+          <a:off x="0" y="0"/>
+          <a:ext cx="0" cy="0"/>
+          <a:chOff x="0" y="0"/>
+          <a:chExt cx="0" cy="0"/>
+        </a:xfrm>
+      </p:grpSpPr>
+      <p:sp>
+        <p:nvSpPr>
+          <p:cNvPr id="2" name="Slide Image Placeholder 1"/>
+          <p:cNvSpPr>
+            <a:spLocks noGrp="1" noRot="1" noChangeAspect="1"/>
+          </p:cNvSpPr>
+          <p:nvPr>
+            <p:ph type="sldImg"/>
+          </p:nvPr>
+        </p:nvSpPr>
+        <p:spPr/>
+      </p:sp>
+      <p:sp>
+        <p:nvSpPr>
+          <p:cNvPr id="3" name="Notes Placeholder 2"/>
+          <p:cNvSpPr>
+            <a:spLocks noGrp="1"/>
+          </p:cNvSpPr>
+          <p:nvPr>
+            <p:ph type="body" idx="1"/>
+          </p:nvPr>
+        </p:nvSpPr>
+        <p:spPr/>
+        <p:txBody>
+          <a:bodyPr/>
+          <a:lstStyle/>
+          <a:p>
+            <a:r>
+              <a:rPr lang="en-US" dirty="0"/>
+              <a:t>Why tuple assignment behaves like a swap? - https://stackoverflow.com/questions/60970431/when-does-a-tuple-assignment-behave-like-a-swap-of-the-involved-vars-and-when</a:t>
+            </a:r>
+            <a:endParaRPr lang="en-IN" dirty="0"/>
+          </a:p>
+        </p:txBody>
+      </p:sp>
+      <p:sp>
+        <p:nvSpPr>
+          <p:cNvPr id="4" name="Slide Number Placeholder 3"/>
+          <p:cNvSpPr>
+            <a:spLocks noGrp="1"/>
+          </p:cNvSpPr>
+          <p:nvPr>
+            <p:ph type="sldNum" sz="quarter" idx="5"/>
+          </p:nvPr>
+        </p:nvSpPr>
+        <p:spPr/>
+        <p:txBody>
+          <a:bodyPr/>
+          <a:lstStyle/>
+          <a:p>
+            <a:fld id="{280196F8-B092-4C30-94DE-95C749B130C6}" type="slidenum">
+              <a:rPr lang="en-IN" smtClean="0"/>
+              <a:t>3</a:t>
+            </a:fld>
+            <a:endParaRPr lang="en-IN"/>
+          </a:p>
+        </p:txBody>
+      </p:sp>
+    </p:spTree>
+    <p:extLst>
+      <p:ext uri="{BB962C8B-B14F-4D97-AF65-F5344CB8AC3E}">
+        <p14:creationId xmlns:p14="http://schemas.microsoft.com/office/powerpoint/2010/main" val="3142768327"/>
+      </p:ext>
+    </p:extLst>
+  </p:cSld>
+  <p:clrMapOvr>
+    <a:masterClrMapping/>
+  </p:clrMapOvr>
+</p:notes>
+</file>
+
 <file path=ppt/slideLayouts/slideLayout1.xml><?xml version="1.0" encoding="utf-8"?>
 <p:sldLayout xmlns:a="http://schemas.openxmlformats.org/drawingml/2006/main" xmlns:r="http://schemas.openxmlformats.org/officeDocument/2006/relationships" xmlns:p="http://schemas.openxmlformats.org/presentationml/2006/main" type="title" preserve="1">
   <p:cSld name="Title Slide">
@@ -267,7 +708,7 @@
           <a:p>
             <a:fld id="{8A016923-DD69-49F6-9B2C-5FE8D8957A6D}" type="datetimeFigureOut">
               <a:rPr lang="en-IN" smtClean="0"/>
-              <a:t>28-08-2021</a:t>
+              <a:t>30-08-2021</a:t>
             </a:fld>
             <a:endParaRPr lang="en-IN"/>
           </a:p>
@@ -467,7 +908,7 @@
           <a:p>
             <a:fld id="{8A016923-DD69-49F6-9B2C-5FE8D8957A6D}" type="datetimeFigureOut">
               <a:rPr lang="en-IN" smtClean="0"/>
-              <a:t>28-08-2021</a:t>
+              <a:t>30-08-2021</a:t>
             </a:fld>
             <a:endParaRPr lang="en-IN"/>
           </a:p>
@@ -677,7 +1118,7 @@
           <a:p>
             <a:fld id="{8A016923-DD69-49F6-9B2C-5FE8D8957A6D}" type="datetimeFigureOut">
               <a:rPr lang="en-IN" smtClean="0"/>
-              <a:t>28-08-2021</a:t>
+              <a:t>30-08-2021</a:t>
             </a:fld>
             <a:endParaRPr lang="en-IN"/>
           </a:p>
@@ -877,7 +1318,7 @@
           <a:p>
             <a:fld id="{8A016923-DD69-49F6-9B2C-5FE8D8957A6D}" type="datetimeFigureOut">
               <a:rPr lang="en-IN" smtClean="0"/>
-              <a:t>28-08-2021</a:t>
+              <a:t>30-08-2021</a:t>
             </a:fld>
             <a:endParaRPr lang="en-IN"/>
           </a:p>
@@ -1153,7 +1594,7 @@
           <a:p>
             <a:fld id="{8A016923-DD69-49F6-9B2C-5FE8D8957A6D}" type="datetimeFigureOut">
               <a:rPr lang="en-IN" smtClean="0"/>
-              <a:t>28-08-2021</a:t>
+              <a:t>30-08-2021</a:t>
             </a:fld>
             <a:endParaRPr lang="en-IN"/>
           </a:p>
@@ -1421,7 +1862,7 @@
           <a:p>
             <a:fld id="{8A016923-DD69-49F6-9B2C-5FE8D8957A6D}" type="datetimeFigureOut">
               <a:rPr lang="en-IN" smtClean="0"/>
-              <a:t>28-08-2021</a:t>
+              <a:t>30-08-2021</a:t>
             </a:fld>
             <a:endParaRPr lang="en-IN"/>
           </a:p>
@@ -1836,7 +2277,7 @@
           <a:p>
             <a:fld id="{8A016923-DD69-49F6-9B2C-5FE8D8957A6D}" type="datetimeFigureOut">
               <a:rPr lang="en-IN" smtClean="0"/>
-              <a:t>28-08-2021</a:t>
+              <a:t>30-08-2021</a:t>
             </a:fld>
             <a:endParaRPr lang="en-IN"/>
           </a:p>
@@ -1978,7 +2419,7 @@
           <a:p>
             <a:fld id="{8A016923-DD69-49F6-9B2C-5FE8D8957A6D}" type="datetimeFigureOut">
               <a:rPr lang="en-IN" smtClean="0"/>
-              <a:t>28-08-2021</a:t>
+              <a:t>30-08-2021</a:t>
             </a:fld>
             <a:endParaRPr lang="en-IN"/>
           </a:p>
@@ -2091,7 +2532,7 @@
           <a:p>
             <a:fld id="{8A016923-DD69-49F6-9B2C-5FE8D8957A6D}" type="datetimeFigureOut">
               <a:rPr lang="en-IN" smtClean="0"/>
-              <a:t>28-08-2021</a:t>
+              <a:t>30-08-2021</a:t>
             </a:fld>
             <a:endParaRPr lang="en-IN"/>
           </a:p>
@@ -2404,7 +2845,7 @@
           <a:p>
             <a:fld id="{8A016923-DD69-49F6-9B2C-5FE8D8957A6D}" type="datetimeFigureOut">
               <a:rPr lang="en-IN" smtClean="0"/>
-              <a:t>28-08-2021</a:t>
+              <a:t>30-08-2021</a:t>
             </a:fld>
             <a:endParaRPr lang="en-IN"/>
           </a:p>
@@ -2693,7 +3134,7 @@
           <a:p>
             <a:fld id="{8A016923-DD69-49F6-9B2C-5FE8D8957A6D}" type="datetimeFigureOut">
               <a:rPr lang="en-IN" smtClean="0"/>
-              <a:t>28-08-2021</a:t>
+              <a:t>30-08-2021</a:t>
             </a:fld>
             <a:endParaRPr lang="en-IN"/>
           </a:p>
@@ -2936,7 +3377,7 @@
           <a:p>
             <a:fld id="{8A016923-DD69-49F6-9B2C-5FE8D8957A6D}" type="datetimeFigureOut">
               <a:rPr lang="en-IN" smtClean="0"/>
-              <a:t>28-08-2021</a:t>
+              <a:t>30-08-2021</a:t>
             </a:fld>
             <a:endParaRPr lang="en-IN"/>
           </a:p>
@@ -3514,7 +3955,7 @@
           <a:p>
             <a:r>
               <a:rPr lang="en-US" dirty="0"/>
-              <a:t>They are indexed by integers, so in that respect they are more like lists</a:t>
+              <a:t>Tuples are indexed by integers, so in that respect they are more like lists</a:t>
             </a:r>
           </a:p>
           <a:p>
@@ -3905,7 +4346,7 @@
           <a:p>
             <a:r>
               <a:rPr lang="en-IN" dirty="0"/>
-              <a:t>If the no of variables on left side as less or more than the variables on right side, the assignment statement will error out</a:t>
+              <a:t>If the no. of variables on left side are less or more than the variables on right side, then the assignment statement will error out</a:t>
             </a:r>
           </a:p>
         </p:txBody>
@@ -3916,36 +4357,6 @@
             <a:extLst>
               <a:ext uri="{FF2B5EF4-FFF2-40B4-BE49-F238E27FC236}">
                 <a16:creationId xmlns:a16="http://schemas.microsoft.com/office/drawing/2014/main" id="{71A2FC36-6D2C-4330-B647-4985C262D082}"/>
-              </a:ext>
-            </a:extLst>
-          </p:cNvPr>
-          <p:cNvPicPr>
-            <a:picLocks noChangeAspect="1"/>
-          </p:cNvPicPr>
-          <p:nvPr/>
-        </p:nvPicPr>
-        <p:blipFill>
-          <a:blip r:embed="rId2"/>
-          <a:stretch>
-            <a:fillRect/>
-          </a:stretch>
-        </p:blipFill>
-        <p:spPr>
-          <a:xfrm>
-            <a:off x="434439" y="5198157"/>
-            <a:ext cx="1514475" cy="914400"/>
-          </a:xfrm>
-          <a:prstGeom prst="rect">
-            <a:avLst/>
-          </a:prstGeom>
-        </p:spPr>
-      </p:pic>
-      <p:pic>
-        <p:nvPicPr>
-          <p:cNvPr id="8" name="Picture 7">
-            <a:extLst>
-              <a:ext uri="{FF2B5EF4-FFF2-40B4-BE49-F238E27FC236}">
-                <a16:creationId xmlns:a16="http://schemas.microsoft.com/office/drawing/2014/main" id="{B42602FB-C5FB-4D93-B723-DC4C1AFB135D}"/>
               </a:ext>
             </a:extLst>
           </p:cNvPr>
@@ -3962,93 +4373,20 @@
         </p:blipFill>
         <p:spPr>
           <a:xfrm>
-            <a:off x="4267200" y="5692487"/>
-            <a:ext cx="1828800" cy="438150"/>
+            <a:off x="434439" y="5198157"/>
+            <a:ext cx="1514475" cy="914400"/>
           </a:xfrm>
           <a:prstGeom prst="rect">
             <a:avLst/>
           </a:prstGeom>
         </p:spPr>
       </p:pic>
-      <p:sp>
-        <p:nvSpPr>
-          <p:cNvPr id="9" name="TextBox 8">
-            <a:extLst>
-              <a:ext uri="{FF2B5EF4-FFF2-40B4-BE49-F238E27FC236}">
-                <a16:creationId xmlns:a16="http://schemas.microsoft.com/office/drawing/2014/main" id="{F5F01AAB-26F0-4273-8576-0D3B759F0B3C}"/>
-              </a:ext>
-            </a:extLst>
-          </p:cNvPr>
-          <p:cNvSpPr txBox="1"/>
-          <p:nvPr/>
-        </p:nvSpPr>
-        <p:spPr>
-          <a:xfrm>
-            <a:off x="110836" y="6130637"/>
-            <a:ext cx="3107377" cy="369332"/>
-          </a:xfrm>
-          <a:prstGeom prst="rect">
-            <a:avLst/>
-          </a:prstGeom>
-          <a:noFill/>
-        </p:spPr>
-        <p:txBody>
-          <a:bodyPr wrap="square" rtlCol="0">
-            <a:spAutoFit/>
-          </a:bodyPr>
-          <a:lstStyle/>
-          <a:p>
-            <a:r>
-              <a:rPr lang="en-US" dirty="0"/>
-              <a:t>Traditional  programming swap</a:t>
-            </a:r>
-            <a:endParaRPr lang="en-IN" dirty="0"/>
-          </a:p>
-        </p:txBody>
-      </p:sp>
-      <p:sp>
-        <p:nvSpPr>
-          <p:cNvPr id="13" name="TextBox 12">
-            <a:extLst>
-              <a:ext uri="{FF2B5EF4-FFF2-40B4-BE49-F238E27FC236}">
-                <a16:creationId xmlns:a16="http://schemas.microsoft.com/office/drawing/2014/main" id="{EFE6C314-B10A-4F69-A4E5-8D93CC7848E1}"/>
-              </a:ext>
-            </a:extLst>
-          </p:cNvPr>
-          <p:cNvSpPr txBox="1"/>
-          <p:nvPr/>
-        </p:nvSpPr>
-        <p:spPr>
-          <a:xfrm>
-            <a:off x="3505200" y="6130637"/>
-            <a:ext cx="3107377" cy="369332"/>
-          </a:xfrm>
-          <a:prstGeom prst="rect">
-            <a:avLst/>
-          </a:prstGeom>
-          <a:noFill/>
-        </p:spPr>
-        <p:txBody>
-          <a:bodyPr wrap="square" rtlCol="0">
-            <a:spAutoFit/>
-          </a:bodyPr>
-          <a:lstStyle/>
-          <a:p>
-            <a:pPr algn="ctr"/>
-            <a:r>
-              <a:rPr lang="en-US" dirty="0"/>
-              <a:t>Tuple Assignment</a:t>
-            </a:r>
-            <a:endParaRPr lang="en-IN" dirty="0"/>
-          </a:p>
-        </p:txBody>
-      </p:sp>
       <p:pic>
         <p:nvPicPr>
-          <p:cNvPr id="14" name="Picture 13">
-            <a:extLst>
-              <a:ext uri="{FF2B5EF4-FFF2-40B4-BE49-F238E27FC236}">
-                <a16:creationId xmlns:a16="http://schemas.microsoft.com/office/drawing/2014/main" id="{C7418F43-8671-4039-A3B0-7E3EFF5640C0}"/>
+          <p:cNvPr id="8" name="Picture 7">
+            <a:extLst>
+              <a:ext uri="{FF2B5EF4-FFF2-40B4-BE49-F238E27FC236}">
+                <a16:creationId xmlns:a16="http://schemas.microsoft.com/office/drawing/2014/main" id="{B42602FB-C5FB-4D93-B723-DC4C1AFB135D}"/>
               </a:ext>
             </a:extLst>
           </p:cNvPr>
@@ -4065,8 +4403,8 @@
         </p:blipFill>
         <p:spPr>
           <a:xfrm>
-            <a:off x="7021347" y="4617132"/>
-            <a:ext cx="4057650" cy="581025"/>
+            <a:off x="4267200" y="5692487"/>
+            <a:ext cx="1828800" cy="438150"/>
           </a:xfrm>
           <a:prstGeom prst="rect">
             <a:avLst/>
@@ -4075,10 +4413,10 @@
       </p:pic>
       <p:sp>
         <p:nvSpPr>
-          <p:cNvPr id="17" name="TextBox 16">
-            <a:extLst>
-              <a:ext uri="{FF2B5EF4-FFF2-40B4-BE49-F238E27FC236}">
-                <a16:creationId xmlns:a16="http://schemas.microsoft.com/office/drawing/2014/main" id="{60EA8BBA-1D7B-4F28-98BE-3C1643DD44C7}"/>
+          <p:cNvPr id="9" name="TextBox 8">
+            <a:extLst>
+              <a:ext uri="{FF2B5EF4-FFF2-40B4-BE49-F238E27FC236}">
+                <a16:creationId xmlns:a16="http://schemas.microsoft.com/office/drawing/2014/main" id="{F5F01AAB-26F0-4273-8576-0D3B759F0B3C}"/>
               </a:ext>
             </a:extLst>
           </p:cNvPr>
@@ -4087,7 +4425,7 @@
         </p:nvSpPr>
         <p:spPr>
           <a:xfrm>
-            <a:off x="7021347" y="6114308"/>
+            <a:off x="110836" y="6130637"/>
             <a:ext cx="3107377" cy="369332"/>
           </a:xfrm>
           <a:prstGeom prst="rect">
@@ -4101,10 +4439,46 @@
           </a:bodyPr>
           <a:lstStyle/>
           <a:p>
+            <a:r>
+              <a:rPr lang="en-US" dirty="0"/>
+              <a:t>Traditional  programming swap</a:t>
+            </a:r>
+            <a:endParaRPr lang="en-IN" dirty="0"/>
+          </a:p>
+        </p:txBody>
+      </p:sp>
+      <p:sp>
+        <p:nvSpPr>
+          <p:cNvPr id="13" name="TextBox 12">
+            <a:extLst>
+              <a:ext uri="{FF2B5EF4-FFF2-40B4-BE49-F238E27FC236}">
+                <a16:creationId xmlns:a16="http://schemas.microsoft.com/office/drawing/2014/main" id="{EFE6C314-B10A-4F69-A4E5-8D93CC7848E1}"/>
+              </a:ext>
+            </a:extLst>
+          </p:cNvPr>
+          <p:cNvSpPr txBox="1"/>
+          <p:nvPr/>
+        </p:nvSpPr>
+        <p:spPr>
+          <a:xfrm>
+            <a:off x="3505200" y="6130637"/>
+            <a:ext cx="3107377" cy="369332"/>
+          </a:xfrm>
+          <a:prstGeom prst="rect">
+            <a:avLst/>
+          </a:prstGeom>
+          <a:noFill/>
+        </p:spPr>
+        <p:txBody>
+          <a:bodyPr wrap="square" rtlCol="0">
+            <a:spAutoFit/>
+          </a:bodyPr>
+          <a:lstStyle/>
+          <a:p>
             <a:pPr algn="ctr"/>
             <a:r>
               <a:rPr lang="en-US" dirty="0"/>
-              <a:t>Error Scenario</a:t>
+              <a:t>Tuple Assignment</a:t>
             </a:r>
             <a:endParaRPr lang="en-IN" dirty="0"/>
           </a:p>
@@ -4112,10 +4486,10 @@
       </p:sp>
       <p:pic>
         <p:nvPicPr>
-          <p:cNvPr id="19" name="Picture 18">
-            <a:extLst>
-              <a:ext uri="{FF2B5EF4-FFF2-40B4-BE49-F238E27FC236}">
-                <a16:creationId xmlns:a16="http://schemas.microsoft.com/office/drawing/2014/main" id="{5747ABB0-CC2B-43C2-9AC5-A65EEE14C90E}"/>
+          <p:cNvPr id="14" name="Picture 13">
+            <a:extLst>
+              <a:ext uri="{FF2B5EF4-FFF2-40B4-BE49-F238E27FC236}">
+                <a16:creationId xmlns:a16="http://schemas.microsoft.com/office/drawing/2014/main" id="{C7418F43-8671-4039-A3B0-7E3EFF5640C0}"/>
               </a:ext>
             </a:extLst>
           </p:cNvPr>
@@ -4126,6 +4500,73 @@
         </p:nvPicPr>
         <p:blipFill>
           <a:blip r:embed="rId5"/>
+          <a:stretch>
+            <a:fillRect/>
+          </a:stretch>
+        </p:blipFill>
+        <p:spPr>
+          <a:xfrm>
+            <a:off x="7021347" y="4617132"/>
+            <a:ext cx="4057650" cy="581025"/>
+          </a:xfrm>
+          <a:prstGeom prst="rect">
+            <a:avLst/>
+          </a:prstGeom>
+        </p:spPr>
+      </p:pic>
+      <p:sp>
+        <p:nvSpPr>
+          <p:cNvPr id="17" name="TextBox 16">
+            <a:extLst>
+              <a:ext uri="{FF2B5EF4-FFF2-40B4-BE49-F238E27FC236}">
+                <a16:creationId xmlns:a16="http://schemas.microsoft.com/office/drawing/2014/main" id="{60EA8BBA-1D7B-4F28-98BE-3C1643DD44C7}"/>
+              </a:ext>
+            </a:extLst>
+          </p:cNvPr>
+          <p:cNvSpPr txBox="1"/>
+          <p:nvPr/>
+        </p:nvSpPr>
+        <p:spPr>
+          <a:xfrm>
+            <a:off x="7021347" y="6114308"/>
+            <a:ext cx="3107377" cy="369332"/>
+          </a:xfrm>
+          <a:prstGeom prst="rect">
+            <a:avLst/>
+          </a:prstGeom>
+          <a:noFill/>
+        </p:spPr>
+        <p:txBody>
+          <a:bodyPr wrap="square" rtlCol="0">
+            <a:spAutoFit/>
+          </a:bodyPr>
+          <a:lstStyle/>
+          <a:p>
+            <a:pPr algn="ctr"/>
+            <a:r>
+              <a:rPr lang="en-US" dirty="0"/>
+              <a:t>Error Scenario</a:t>
+            </a:r>
+            <a:endParaRPr lang="en-IN" dirty="0"/>
+          </a:p>
+        </p:txBody>
+      </p:sp>
+      <p:pic>
+        <p:nvPicPr>
+          <p:cNvPr id="19" name="Picture 18">
+            <a:extLst>
+              <a:ext uri="{FF2B5EF4-FFF2-40B4-BE49-F238E27FC236}">
+                <a16:creationId xmlns:a16="http://schemas.microsoft.com/office/drawing/2014/main" id="{5747ABB0-CC2B-43C2-9AC5-A65EEE14C90E}"/>
+              </a:ext>
+            </a:extLst>
+          </p:cNvPr>
+          <p:cNvPicPr>
+            <a:picLocks noChangeAspect="1"/>
+          </p:cNvPicPr>
+          <p:nvPr/>
+        </p:nvPicPr>
+        <p:blipFill>
+          <a:blip r:embed="rId6"/>
           <a:stretch>
             <a:fillRect/>
           </a:stretch>
@@ -4249,11 +4690,11 @@
             </a:r>
             <a:r>
               <a:rPr lang="en-US" dirty="0" err="1"/>
-              <a:t>Div</a:t>
+              <a:t>Divmod</a:t>
             </a:r>
             <a:r>
               <a:rPr lang="en-US" dirty="0"/>
-              <a:t> mod function takes 2 arguments and return a tuple Ref: Ex1</a:t>
+              <a:t> function takes 2 arguments and return a tuple Ref: Ex1</a:t>
             </a:r>
           </a:p>
           <a:p>
@@ -4287,7 +4728,7 @@
         </p:blipFill>
         <p:spPr>
           <a:xfrm>
-            <a:off x="772886" y="3541361"/>
+            <a:off x="799552" y="3489479"/>
             <a:ext cx="2343150" cy="819150"/>
           </a:xfrm>
           <a:prstGeom prst="rect">
@@ -4492,15 +4933,7 @@
           <a:p>
             <a:r>
               <a:rPr lang="en-US" dirty="0"/>
-              <a:t>Functions can take variable number of arguments and a parameter name starting with a ‘*’ gather arguments in a tuple of the parameter </a:t>
-            </a:r>
-            <a:r>
-              <a:rPr lang="en-US" dirty="0" err="1"/>
-              <a:t>nameRef</a:t>
-            </a:r>
-            <a:r>
-              <a:rPr lang="en-US" dirty="0"/>
-              <a:t>: Ex1, Ex2</a:t>
+              <a:t>Functions can take variable number of arguments and a parameter name starting with a ‘*’ gather arguments in a tuple of the parameter name Ref: Ex1, Ex2</a:t>
             </a:r>
           </a:p>
           <a:p>
@@ -5397,4 +5830,299 @@
     </a:ext>
   </a:extLst>
 </a:theme>
+</file>
+
+<file path=ppt/theme/theme2.xml><?xml version="1.0" encoding="utf-8"?>
+<a:theme xmlns:a="http://schemas.openxmlformats.org/drawingml/2006/main" name="Office Theme">
+  <a:themeElements>
+    <a:clrScheme name="Office">
+      <a:dk1>
+        <a:sysClr val="windowText" lastClr="000000"/>
+      </a:dk1>
+      <a:lt1>
+        <a:sysClr val="window" lastClr="FFFFFF"/>
+      </a:lt1>
+      <a:dk2>
+        <a:srgbClr val="44546A"/>
+      </a:dk2>
+      <a:lt2>
+        <a:srgbClr val="E7E6E6"/>
+      </a:lt2>
+      <a:accent1>
+        <a:srgbClr val="4472C4"/>
+      </a:accent1>
+      <a:accent2>
+        <a:srgbClr val="ED7D31"/>
+      </a:accent2>
+      <a:accent3>
+        <a:srgbClr val="A5A5A5"/>
+      </a:accent3>
+      <a:accent4>
+        <a:srgbClr val="FFC000"/>
+      </a:accent4>
+      <a:accent5>
+        <a:srgbClr val="5B9BD5"/>
+      </a:accent5>
+      <a:accent6>
+        <a:srgbClr val="70AD47"/>
+      </a:accent6>
+      <a:hlink>
+        <a:srgbClr val="0563C1"/>
+      </a:hlink>
+      <a:folHlink>
+        <a:srgbClr val="954F72"/>
+      </a:folHlink>
+    </a:clrScheme>
+    <a:fontScheme name="Office">
+      <a:majorFont>
+        <a:latin typeface="Calibri Light" panose="020F0302020204030204"/>
+        <a:ea typeface=""/>
+        <a:cs typeface=""/>
+        <a:font script="Jpan" typeface="游ゴシック Light"/>
+        <a:font script="Hang" typeface="맑은 고딕"/>
+        <a:font script="Hans" typeface="等线 Light"/>
+        <a:font script="Hant" typeface="新細明體"/>
+        <a:font script="Arab" typeface="Times New Roman"/>
+        <a:font script="Hebr" typeface="Times New Roman"/>
+        <a:font script="Thai" typeface="Angsana New"/>
+        <a:font script="Ethi" typeface="Nyala"/>
+        <a:font script="Beng" typeface="Vrinda"/>
+        <a:font script="Gujr" typeface="Shruti"/>
+        <a:font script="Khmr" typeface="MoolBoran"/>
+        <a:font script="Knda" typeface="Tunga"/>
+        <a:font script="Guru" typeface="Raavi"/>
+        <a:font script="Cans" typeface="Euphemia"/>
+        <a:font script="Cher" typeface="Plantagenet Cherokee"/>
+        <a:font script="Yiii" typeface="Microsoft Yi Baiti"/>
+        <a:font script="Tibt" typeface="Microsoft Himalaya"/>
+        <a:font script="Thaa" typeface="MV Boli"/>
+        <a:font script="Deva" typeface="Mangal"/>
+        <a:font script="Telu" typeface="Gautami"/>
+        <a:font script="Taml" typeface="Latha"/>
+        <a:font script="Syrc" typeface="Estrangelo Edessa"/>
+        <a:font script="Orya" typeface="Kalinga"/>
+        <a:font script="Mlym" typeface="Kartika"/>
+        <a:font script="Laoo" typeface="DokChampa"/>
+        <a:font script="Sinh" typeface="Iskoola Pota"/>
+        <a:font script="Mong" typeface="Mongolian Baiti"/>
+        <a:font script="Viet" typeface="Times New Roman"/>
+        <a:font script="Uigh" typeface="Microsoft Uighur"/>
+        <a:font script="Geor" typeface="Sylfaen"/>
+        <a:font script="Armn" typeface="Arial"/>
+        <a:font script="Bugi" typeface="Leelawadee UI"/>
+        <a:font script="Bopo" typeface="Microsoft JhengHei"/>
+        <a:font script="Java" typeface="Javanese Text"/>
+        <a:font script="Lisu" typeface="Segoe UI"/>
+        <a:font script="Mymr" typeface="Myanmar Text"/>
+        <a:font script="Nkoo" typeface="Ebrima"/>
+        <a:font script="Olck" typeface="Nirmala UI"/>
+        <a:font script="Osma" typeface="Ebrima"/>
+        <a:font script="Phag" typeface="Phagspa"/>
+        <a:font script="Syrn" typeface="Estrangelo Edessa"/>
+        <a:font script="Syrj" typeface="Estrangelo Edessa"/>
+        <a:font script="Syre" typeface="Estrangelo Edessa"/>
+        <a:font script="Sora" typeface="Nirmala UI"/>
+        <a:font script="Tale" typeface="Microsoft Tai Le"/>
+        <a:font script="Talu" typeface="Microsoft New Tai Lue"/>
+        <a:font script="Tfng" typeface="Ebrima"/>
+      </a:majorFont>
+      <a:minorFont>
+        <a:latin typeface="Calibri" panose="020F0502020204030204"/>
+        <a:ea typeface=""/>
+        <a:cs typeface=""/>
+        <a:font script="Jpan" typeface="游ゴシック"/>
+        <a:font script="Hang" typeface="맑은 고딕"/>
+        <a:font script="Hans" typeface="等线"/>
+        <a:font script="Hant" typeface="新細明體"/>
+        <a:font script="Arab" typeface="Arial"/>
+        <a:font script="Hebr" typeface="Arial"/>
+        <a:font script="Thai" typeface="Cordia New"/>
+        <a:font script="Ethi" typeface="Nyala"/>
+        <a:font script="Beng" typeface="Vrinda"/>
+        <a:font script="Gujr" typeface="Shruti"/>
+        <a:font script="Khmr" typeface="DaunPenh"/>
+        <a:font script="Knda" typeface="Tunga"/>
+        <a:font script="Guru" typeface="Raavi"/>
+        <a:font script="Cans" typeface="Euphemia"/>
+        <a:font script="Cher" typeface="Plantagenet Cherokee"/>
+        <a:font script="Yiii" typeface="Microsoft Yi Baiti"/>
+        <a:font script="Tibt" typeface="Microsoft Himalaya"/>
+        <a:font script="Thaa" typeface="MV Boli"/>
+        <a:font script="Deva" typeface="Mangal"/>
+        <a:font script="Telu" typeface="Gautami"/>
+        <a:font script="Taml" typeface="Latha"/>
+        <a:font script="Syrc" typeface="Estrangelo Edessa"/>
+        <a:font script="Orya" typeface="Kalinga"/>
+        <a:font script="Mlym" typeface="Kartika"/>
+        <a:font script="Laoo" typeface="DokChampa"/>
+        <a:font script="Sinh" typeface="Iskoola Pota"/>
+        <a:font script="Mong" typeface="Mongolian Baiti"/>
+        <a:font script="Viet" typeface="Arial"/>
+        <a:font script="Uigh" typeface="Microsoft Uighur"/>
+        <a:font script="Geor" typeface="Sylfaen"/>
+        <a:font script="Armn" typeface="Arial"/>
+        <a:font script="Bugi" typeface="Leelawadee UI"/>
+        <a:font script="Bopo" typeface="Microsoft JhengHei"/>
+        <a:font script="Java" typeface="Javanese Text"/>
+        <a:font script="Lisu" typeface="Segoe UI"/>
+        <a:font script="Mymr" typeface="Myanmar Text"/>
+        <a:font script="Nkoo" typeface="Ebrima"/>
+        <a:font script="Olck" typeface="Nirmala UI"/>
+        <a:font script="Osma" typeface="Ebrima"/>
+        <a:font script="Phag" typeface="Phagspa"/>
+        <a:font script="Syrn" typeface="Estrangelo Edessa"/>
+        <a:font script="Syrj" typeface="Estrangelo Edessa"/>
+        <a:font script="Syre" typeface="Estrangelo Edessa"/>
+        <a:font script="Sora" typeface="Nirmala UI"/>
+        <a:font script="Tale" typeface="Microsoft Tai Le"/>
+        <a:font script="Talu" typeface="Microsoft New Tai Lue"/>
+        <a:font script="Tfng" typeface="Ebrima"/>
+      </a:minorFont>
+    </a:fontScheme>
+    <a:fmtScheme name="Office">
+      <a:fillStyleLst>
+        <a:solidFill>
+          <a:schemeClr val="phClr"/>
+        </a:solidFill>
+        <a:gradFill rotWithShape="1">
+          <a:gsLst>
+            <a:gs pos="0">
+              <a:schemeClr val="phClr">
+                <a:lumMod val="110000"/>
+                <a:satMod val="105000"/>
+                <a:tint val="67000"/>
+              </a:schemeClr>
+            </a:gs>
+            <a:gs pos="50000">
+              <a:schemeClr val="phClr">
+                <a:lumMod val="105000"/>
+                <a:satMod val="103000"/>
+                <a:tint val="73000"/>
+              </a:schemeClr>
+            </a:gs>
+            <a:gs pos="100000">
+              <a:schemeClr val="phClr">
+                <a:lumMod val="105000"/>
+                <a:satMod val="109000"/>
+                <a:tint val="81000"/>
+              </a:schemeClr>
+            </a:gs>
+          </a:gsLst>
+          <a:lin ang="5400000" scaled="0"/>
+        </a:gradFill>
+        <a:gradFill rotWithShape="1">
+          <a:gsLst>
+            <a:gs pos="0">
+              <a:schemeClr val="phClr">
+                <a:satMod val="103000"/>
+                <a:lumMod val="102000"/>
+                <a:tint val="94000"/>
+              </a:schemeClr>
+            </a:gs>
+            <a:gs pos="50000">
+              <a:schemeClr val="phClr">
+                <a:satMod val="110000"/>
+                <a:lumMod val="100000"/>
+                <a:shade val="100000"/>
+              </a:schemeClr>
+            </a:gs>
+            <a:gs pos="100000">
+              <a:schemeClr val="phClr">
+                <a:lumMod val="99000"/>
+                <a:satMod val="120000"/>
+                <a:shade val="78000"/>
+              </a:schemeClr>
+            </a:gs>
+          </a:gsLst>
+          <a:lin ang="5400000" scaled="0"/>
+        </a:gradFill>
+      </a:fillStyleLst>
+      <a:lnStyleLst>
+        <a:ln w="6350" cap="flat" cmpd="sng" algn="ctr">
+          <a:solidFill>
+            <a:schemeClr val="phClr"/>
+          </a:solidFill>
+          <a:prstDash val="solid"/>
+          <a:miter lim="800000"/>
+        </a:ln>
+        <a:ln w="12700" cap="flat" cmpd="sng" algn="ctr">
+          <a:solidFill>
+            <a:schemeClr val="phClr"/>
+          </a:solidFill>
+          <a:prstDash val="solid"/>
+          <a:miter lim="800000"/>
+        </a:ln>
+        <a:ln w="19050" cap="flat" cmpd="sng" algn="ctr">
+          <a:solidFill>
+            <a:schemeClr val="phClr"/>
+          </a:solidFill>
+          <a:prstDash val="solid"/>
+          <a:miter lim="800000"/>
+        </a:ln>
+      </a:lnStyleLst>
+      <a:effectStyleLst>
+        <a:effectStyle>
+          <a:effectLst/>
+        </a:effectStyle>
+        <a:effectStyle>
+          <a:effectLst/>
+        </a:effectStyle>
+        <a:effectStyle>
+          <a:effectLst>
+            <a:outerShdw blurRad="57150" dist="19050" dir="5400000" algn="ctr" rotWithShape="0">
+              <a:srgbClr val="000000">
+                <a:alpha val="63000"/>
+              </a:srgbClr>
+            </a:outerShdw>
+          </a:effectLst>
+        </a:effectStyle>
+      </a:effectStyleLst>
+      <a:bgFillStyleLst>
+        <a:solidFill>
+          <a:schemeClr val="phClr"/>
+        </a:solidFill>
+        <a:solidFill>
+          <a:schemeClr val="phClr">
+            <a:tint val="95000"/>
+            <a:satMod val="170000"/>
+          </a:schemeClr>
+        </a:solidFill>
+        <a:gradFill rotWithShape="1">
+          <a:gsLst>
+            <a:gs pos="0">
+              <a:schemeClr val="phClr">
+                <a:tint val="93000"/>
+                <a:satMod val="150000"/>
+                <a:shade val="98000"/>
+                <a:lumMod val="102000"/>
+              </a:schemeClr>
+            </a:gs>
+            <a:gs pos="50000">
+              <a:schemeClr val="phClr">
+                <a:tint val="98000"/>
+                <a:satMod val="130000"/>
+                <a:shade val="90000"/>
+                <a:lumMod val="103000"/>
+              </a:schemeClr>
+            </a:gs>
+            <a:gs pos="100000">
+              <a:schemeClr val="phClr">
+                <a:shade val="63000"/>
+                <a:satMod val="120000"/>
+              </a:schemeClr>
+            </a:gs>
+          </a:gsLst>
+          <a:lin ang="5400000" scaled="0"/>
+        </a:gradFill>
+      </a:bgFillStyleLst>
+    </a:fmtScheme>
+  </a:themeElements>
+  <a:objectDefaults/>
+  <a:extraClrSchemeLst/>
+  <a:extLst>
+    <a:ext uri="{05A4C25C-085E-4340-85A3-A5531E510DB2}">
+      <thm15:themeFamily xmlns:thm15="http://schemas.microsoft.com/office/thememl/2012/main" name="Office Theme" id="{62F939B6-93AF-4DB8-9C6B-D6C7DFDC589F}" vid="{4A3C46E8-61CC-4603-A589-7422A47A8E4A}"/>
+    </a:ext>
+  </a:extLst>
+</a:theme>
 </file>
</xml_diff>